<commit_message>
added figures for dissertation and updated imputation comparison code
</commit_message>
<xml_diff>
--- a/meetings/week 23 Meeting.pptx
+++ b/meetings/week 23 Meeting.pptx
@@ -144,7 +144,7 @@
 <file path=ppt/revisionInfo.xml><?xml version="1.0" encoding="utf-8"?>
 <p1510:revInfo xmlns:a="http://schemas.openxmlformats.org/drawingml/2006/main" xmlns:r="http://schemas.openxmlformats.org/officeDocument/2006/relationships" xmlns:p1510="http://schemas.microsoft.com/office/powerpoint/2015/10/main">
   <p1510:revLst>
-    <p1510:client id="{1136F5F5-ECF4-4BC2-B60B-761E2E05606E}" v="781" dt="2022-04-02T22:31:18.222"/>
+    <p1510:client id="{1136F5F5-ECF4-4BC2-B60B-761E2E05606E}" v="782" dt="2022-04-05T23:13:08.882"/>
   </p1510:revLst>
 </p1510:revInfo>
 </file>
@@ -154,10 +154,25 @@
   <pc:docChgLst>
     <pc:chgData name="toby lee" userId="c2b0b406bfa6151f" providerId="LiveId" clId="{1136F5F5-ECF4-4BC2-B60B-761E2E05606E}"/>
     <pc:docChg chg="undo redo custSel addSld delSld modSld sldOrd">
-      <pc:chgData name="toby lee" userId="c2b0b406bfa6151f" providerId="LiveId" clId="{1136F5F5-ECF4-4BC2-B60B-761E2E05606E}" dt="2022-04-02T22:33:39.699" v="6788" actId="1076"/>
+      <pc:chgData name="toby lee" userId="c2b0b406bfa6151f" providerId="LiveId" clId="{1136F5F5-ECF4-4BC2-B60B-761E2E05606E}" dt="2022-04-05T23:13:11.188" v="6791" actId="21"/>
       <pc:docMkLst>
         <pc:docMk/>
       </pc:docMkLst>
+      <pc:sldChg chg="addSp delSp modSp mod">
+        <pc:chgData name="toby lee" userId="c2b0b406bfa6151f" providerId="LiveId" clId="{1136F5F5-ECF4-4BC2-B60B-761E2E05606E}" dt="2022-04-05T23:13:11.188" v="6791" actId="21"/>
+        <pc:sldMkLst>
+          <pc:docMk/>
+          <pc:sldMk cId="3988247216" sldId="259"/>
+        </pc:sldMkLst>
+        <pc:picChg chg="add del mod">
+          <ac:chgData name="toby lee" userId="c2b0b406bfa6151f" providerId="LiveId" clId="{1136F5F5-ECF4-4BC2-B60B-761E2E05606E}" dt="2022-04-05T23:13:11.188" v="6791" actId="21"/>
+          <ac:picMkLst>
+            <pc:docMk/>
+            <pc:sldMk cId="3988247216" sldId="259"/>
+            <ac:picMk id="6" creationId="{57E17711-83E9-49F3-BC00-BB5AEBF46E31}"/>
+          </ac:picMkLst>
+        </pc:picChg>
+      </pc:sldChg>
       <pc:sldChg chg="addSp delSp modSp new mod">
         <pc:chgData name="toby lee" userId="c2b0b406bfa6151f" providerId="LiveId" clId="{1136F5F5-ECF4-4BC2-B60B-761E2E05606E}" dt="2022-03-31T04:51:02.558" v="4885" actId="478"/>
         <pc:sldMkLst>
@@ -6608,7 +6623,7 @@
           <a:p>
             <a:fld id="{74C09B2C-6D22-482F-A730-574A9977E76E}" type="datetimeFigureOut">
               <a:rPr lang="en-GB" smtClean="0"/>
-              <a:t>02/04/2022</a:t>
+              <a:t>06/04/2022</a:t>
             </a:fld>
             <a:endParaRPr lang="en-GB"/>
           </a:p>
@@ -7114,7 +7129,7 @@
           <a:p>
             <a:fld id="{ED291B17-9318-49DB-B28B-6E5994AE9581}" type="datetime1">
               <a:rPr lang="en-US" smtClean="0"/>
-              <a:t>4/2/2022</a:t>
+              <a:t>4/6/2022</a:t>
             </a:fld>
             <a:endParaRPr lang="en-US" dirty="0"/>
           </a:p>
@@ -7317,7 +7332,7 @@
           <a:p>
             <a:fld id="{2CED4963-E985-44C4-B8C4-FDD613B7C2F8}" type="datetime1">
               <a:rPr lang="en-US" smtClean="0"/>
-              <a:t>4/2/2022</a:t>
+              <a:t>4/6/2022</a:t>
             </a:fld>
             <a:endParaRPr lang="en-US" dirty="0"/>
           </a:p>
@@ -7679,7 +7694,7 @@
           <a:p>
             <a:fld id="{ED291B17-9318-49DB-B28B-6E5994AE9581}" type="datetime1">
               <a:rPr lang="en-US" smtClean="0"/>
-              <a:t>4/2/2022</a:t>
+              <a:t>4/6/2022</a:t>
             </a:fld>
             <a:endParaRPr lang="en-US" dirty="0"/>
           </a:p>
@@ -7877,7 +7892,7 @@
           <a:p>
             <a:fld id="{78DD82B9-B8EE-4375-B6FF-88FA6ABB15D9}" type="datetime1">
               <a:rPr lang="en-US" smtClean="0"/>
-              <a:t>4/2/2022</a:t>
+              <a:t>4/6/2022</a:t>
             </a:fld>
             <a:endParaRPr lang="en-US" dirty="0"/>
           </a:p>
@@ -8189,7 +8204,7 @@
           <a:p>
             <a:fld id="{B2497495-0637-405E-AE64-5CC7506D51F5}" type="datetime1">
               <a:rPr lang="en-US" smtClean="0"/>
-              <a:t>4/2/2022</a:t>
+              <a:t>4/6/2022</a:t>
             </a:fld>
             <a:endParaRPr lang="en-US" dirty="0"/>
           </a:p>
@@ -8442,7 +8457,7 @@
           <a:p>
             <a:fld id="{7BFFD690-9426-415D-8B65-26881E07B2D4}" type="datetime1">
               <a:rPr lang="en-US" smtClean="0"/>
-              <a:t>4/2/2022</a:t>
+              <a:t>4/6/2022</a:t>
             </a:fld>
             <a:endParaRPr lang="en-US" dirty="0"/>
           </a:p>
@@ -8864,7 +8879,7 @@
           <a:p>
             <a:fld id="{04C4989A-474C-40DE-95B9-011C28B71673}" type="datetime1">
               <a:rPr lang="en-US" smtClean="0"/>
-              <a:t>4/2/2022</a:t>
+              <a:t>4/6/2022</a:t>
             </a:fld>
             <a:endParaRPr lang="en-US" dirty="0"/>
           </a:p>
@@ -8987,7 +9002,7 @@
           <a:p>
             <a:fld id="{5DB4ED54-5B5E-4A04-93D3-5772E3CE3818}" type="datetime1">
               <a:rPr lang="en-US" smtClean="0"/>
-              <a:t>4/2/2022</a:t>
+              <a:t>4/6/2022</a:t>
             </a:fld>
             <a:endParaRPr lang="en-US" dirty="0"/>
           </a:p>
@@ -9082,7 +9097,7 @@
           <a:p>
             <a:fld id="{4EDE50D6-574B-40AF-946F-D52A04ADE379}" type="datetime1">
               <a:rPr lang="en-US" smtClean="0"/>
-              <a:t>4/2/2022</a:t>
+              <a:t>4/6/2022</a:t>
             </a:fld>
             <a:endParaRPr lang="en-US" dirty="0"/>
           </a:p>
@@ -9459,7 +9474,7 @@
           <a:p>
             <a:fld id="{D82884F1-FFEA-405F-9602-3DCA865EDA4E}" type="datetime1">
               <a:rPr lang="en-US" smtClean="0"/>
-              <a:t>4/2/2022</a:t>
+              <a:t>4/6/2022</a:t>
             </a:fld>
             <a:endParaRPr lang="en-US" dirty="0"/>
           </a:p>
@@ -9752,7 +9767,7 @@
           <a:p>
             <a:fld id="{7E18DB4A-8810-4A10-AD5C-D5E2C667F5B3}" type="datetime1">
               <a:rPr lang="en-US" smtClean="0"/>
-              <a:t>4/2/2022</a:t>
+              <a:t>4/6/2022</a:t>
             </a:fld>
             <a:endParaRPr lang="en-US" dirty="0"/>
           </a:p>
@@ -9967,7 +9982,7 @@
           <a:p>
             <a:fld id="{ED291B17-9318-49DB-B28B-6E5994AE9581}" type="datetime1">
               <a:rPr lang="en-US" smtClean="0"/>
-              <a:t>4/2/2022</a:t>
+              <a:t>4/6/2022</a:t>
             </a:fld>
             <a:endParaRPr lang="en-US" dirty="0"/>
           </a:p>

</xml_diff>